<commit_message>
Quick changes to powerpoint animations
</commit_message>
<xml_diff>
--- a/Doc/PowerPoint.pptx
+++ b/Doc/PowerPoint.pptx
@@ -5,7 +5,7 @@
     <p:sldMasterId id="2147483672" r:id="rId1"/>
   </p:sldMasterIdLst>
   <p:notesMasterIdLst>
-    <p:notesMasterId r:id="rId12"/>
+    <p:notesMasterId r:id="rId11"/>
   </p:notesMasterIdLst>
   <p:sldIdLst>
     <p:sldId id="256" r:id="rId2"/>
@@ -13,11 +13,10 @@
     <p:sldId id="274" r:id="rId4"/>
     <p:sldId id="273" r:id="rId5"/>
     <p:sldId id="278" r:id="rId6"/>
-    <p:sldId id="276" r:id="rId7"/>
-    <p:sldId id="277" r:id="rId8"/>
-    <p:sldId id="271" r:id="rId9"/>
-    <p:sldId id="272" r:id="rId10"/>
-    <p:sldId id="270" r:id="rId11"/>
+    <p:sldId id="277" r:id="rId7"/>
+    <p:sldId id="271" r:id="rId8"/>
+    <p:sldId id="272" r:id="rId9"/>
+    <p:sldId id="270" r:id="rId10"/>
   </p:sldIdLst>
   <p:sldSz cx="12192000" cy="6858000"/>
   <p:notesSz cx="6858000" cy="9144000"/>
@@ -119,6 +118,9 @@
   <p:extLst>
     <p:ext uri="{EFAFB233-063F-42B5-8137-9DF3F51BA10A}">
       <p15:sldGuideLst xmlns:p15="http://schemas.microsoft.com/office/powerpoint/2012/main"/>
+    </p:ext>
+    <p:ext uri="{2D200454-40CA-4A62-9FC3-DE9A4176ACB9}">
+      <p15:notesGuideLst xmlns:p15="http://schemas.microsoft.com/office/powerpoint/2012/main"/>
     </p:ext>
   </p:extLst>
 </p:presentation>
@@ -6787,186 +6789,6 @@
 </p:sld>
 </file>
 
-<file path=ppt/slides/slide10.xml><?xml version="1.0" encoding="utf-8"?>
-<p:sld xmlns:a="http://schemas.openxmlformats.org/drawingml/2006/main" xmlns:r="http://schemas.openxmlformats.org/officeDocument/2006/relationships" xmlns:p="http://schemas.openxmlformats.org/presentationml/2006/main">
-  <p:cSld>
-    <p:spTree>
-      <p:nvGrpSpPr>
-        <p:cNvPr id="1" name=""/>
-        <p:cNvGrpSpPr/>
-        <p:nvPr/>
-      </p:nvGrpSpPr>
-      <p:grpSpPr>
-        <a:xfrm>
-          <a:off x="0" y="0"/>
-          <a:ext cx="0" cy="0"/>
-          <a:chOff x="0" y="0"/>
-          <a:chExt cx="0" cy="0"/>
-        </a:xfrm>
-      </p:grpSpPr>
-      <p:sp>
-        <p:nvSpPr>
-          <p:cNvPr id="2" name="Titre 1"/>
-          <p:cNvSpPr>
-            <a:spLocks noGrp="1"/>
-          </p:cNvSpPr>
-          <p:nvPr>
-            <p:ph type="title"/>
-          </p:nvPr>
-        </p:nvSpPr>
-        <p:spPr/>
-        <p:txBody>
-          <a:bodyPr/>
-          <a:lstStyle/>
-          <a:p>
-            <a:r>
-              <a:rPr lang="fr-CA" dirty="0"/>
-              <a:t>MERCI!</a:t>
-            </a:r>
-          </a:p>
-        </p:txBody>
-      </p:sp>
-      <p:sp>
-        <p:nvSpPr>
-          <p:cNvPr id="4" name="Espace réservé du texte 3"/>
-          <p:cNvSpPr>
-            <a:spLocks noGrp="1"/>
-          </p:cNvSpPr>
-          <p:nvPr>
-            <p:ph type="body" sz="half" idx="2"/>
-          </p:nvPr>
-        </p:nvSpPr>
-        <p:spPr/>
-        <p:txBody>
-          <a:bodyPr/>
-          <a:lstStyle/>
-          <a:p>
-            <a:endParaRPr lang="fr-CA"/>
-          </a:p>
-        </p:txBody>
-      </p:sp>
-      <p:pic>
-        <p:nvPicPr>
-          <p:cNvPr id="7" name="Image 6"/>
-          <p:cNvPicPr>
-            <a:picLocks noChangeAspect="1"/>
-          </p:cNvPicPr>
-          <p:nvPr/>
-        </p:nvPicPr>
-        <p:blipFill>
-          <a:blip r:embed="rId2" cstate="print">
-            <a:extLst>
-              <a:ext uri="{28A0092B-C50C-407E-A947-70E740481C1C}">
-                <a14:useLocalDpi xmlns:a14="http://schemas.microsoft.com/office/drawing/2010/main" val="0"/>
-              </a:ext>
-            </a:extLst>
-          </a:blip>
-          <a:stretch>
-            <a:fillRect/>
-          </a:stretch>
-        </p:blipFill>
-        <p:spPr>
-          <a:xfrm>
-            <a:off x="0" y="-1"/>
-            <a:ext cx="9997448" cy="5623565"/>
-          </a:xfrm>
-          <a:prstGeom prst="rect">
-            <a:avLst/>
-          </a:prstGeom>
-        </p:spPr>
-      </p:pic>
-      <p:pic>
-        <p:nvPicPr>
-          <p:cNvPr id="1026" name="Picture 2" descr="https://scontent.fyhu1-1.fna.fbcdn.net/v/t1.15752-9/s2048x2048/61667264_357624584892437_8334581975750803456_n.jpg?_nc_cat=105&amp;_nc_ht=scontent.fyhu1-1.fna&amp;oh=fa8e486d2f34afefa20af0eebce5f359&amp;oe=5D5D624F"/>
-          <p:cNvPicPr>
-            <a:picLocks noChangeAspect="1" noChangeArrowheads="1"/>
-          </p:cNvPicPr>
-          <p:nvPr/>
-        </p:nvPicPr>
-        <p:blipFill rotWithShape="1">
-          <a:blip r:embed="rId3" cstate="print">
-            <a:extLst>
-              <a:ext uri="{28A0092B-C50C-407E-A947-70E740481C1C}">
-                <a14:useLocalDpi xmlns:a14="http://schemas.microsoft.com/office/drawing/2010/main" val="0"/>
-              </a:ext>
-            </a:extLst>
-          </a:blip>
-          <a:srcRect l="15968" t="24847" r="29727" b="3709"/>
-          <a:stretch/>
-        </p:blipFill>
-        <p:spPr bwMode="auto">
-          <a:xfrm>
-            <a:off x="333376" y="3732117"/>
-            <a:ext cx="3905250" cy="2890021"/>
-          </a:xfrm>
-          <a:prstGeom prst="snip2DiagRect">
-            <a:avLst/>
-          </a:prstGeom>
-          <a:solidFill>
-            <a:srgbClr val="FFFFFF">
-              <a:shade val="85000"/>
-            </a:srgbClr>
-          </a:solidFill>
-          <a:ln w="88900" cap="sq">
-            <a:solidFill>
-              <a:srgbClr val="FFFFFF"/>
-            </a:solidFill>
-            <a:miter lim="800000"/>
-          </a:ln>
-          <a:effectLst>
-            <a:outerShdw blurRad="88900" algn="tl" rotWithShape="0">
-              <a:srgbClr val="000000">
-                <a:alpha val="45000"/>
-              </a:srgbClr>
-            </a:outerShdw>
-          </a:effectLst>
-          <a:scene3d>
-            <a:camera prst="orthographicFront"/>
-            <a:lightRig rig="twoPt" dir="t">
-              <a:rot lat="0" lon="0" rev="7200000"/>
-            </a:lightRig>
-          </a:scene3d>
-          <a:sp3d>
-            <a:bevelT w="25400" h="19050"/>
-            <a:contourClr>
-              <a:srgbClr val="FFFFFF"/>
-            </a:contourClr>
-          </a:sp3d>
-          <a:extLst/>
-        </p:spPr>
-      </p:pic>
-    </p:spTree>
-    <p:extLst>
-      <p:ext uri="{BB962C8B-B14F-4D97-AF65-F5344CB8AC3E}">
-        <p14:creationId xmlns:p14="http://schemas.microsoft.com/office/powerpoint/2010/main" val="2047355086"/>
-      </p:ext>
-    </p:extLst>
-  </p:cSld>
-  <p:clrMapOvr>
-    <a:masterClrMapping/>
-  </p:clrMapOvr>
-  <mc:AlternateContent xmlns:mc="http://schemas.openxmlformats.org/markup-compatibility/2006" xmlns:p14="http://schemas.microsoft.com/office/powerpoint/2010/main">
-    <mc:Choice Requires="p14">
-      <p:transition p14:dur="100">
-        <p:dissolve/>
-      </p:transition>
-    </mc:Choice>
-    <mc:Fallback xmlns="">
-      <p:transition>
-        <p:dissolve/>
-      </p:transition>
-    </mc:Fallback>
-  </mc:AlternateContent>
-  <p:timing>
-    <p:tnLst>
-      <p:par>
-        <p:cTn id="1" dur="indefinite" restart="never" nodeType="tmRoot"/>
-      </p:par>
-    </p:tnLst>
-  </p:timing>
-</p:sld>
-</file>
-
 <file path=ppt/slides/slide2.xml><?xml version="1.0" encoding="utf-8"?>
 <p:sld xmlns:a="http://schemas.openxmlformats.org/drawingml/2006/main" xmlns:r="http://schemas.openxmlformats.org/officeDocument/2006/relationships" xmlns:p="http://schemas.openxmlformats.org/presentationml/2006/main">
   <p:cSld>
@@ -15392,6 +15214,9 @@
                     <p:cTn id="3" fill="hold">
                       <p:stCondLst>
                         <p:cond delay="indefinite"/>
+                        <p:cond evt="onBegin" delay="0">
+                          <p:tn val="2"/>
+                        </p:cond>
                       </p:stCondLst>
                       <p:childTnLst>
                         <p:par>
@@ -15401,7 +15226,7 @@
                             </p:stCondLst>
                             <p:childTnLst>
                               <p:par>
-                                <p:cTn id="5" presetID="26" presetClass="path" presetSubtype="0" accel="50000" decel="50000" fill="hold" nodeType="clickEffect">
+                                <p:cTn id="5" presetID="26" presetClass="path" presetSubtype="0" accel="50000" decel="50000" fill="hold" nodeType="withEffect">
                                   <p:stCondLst>
                                     <p:cond delay="0"/>
                                   </p:stCondLst>
@@ -15578,343 +15403,6 @@
 </file>
 
 <file path=ppt/slides/slide6.xml><?xml version="1.0" encoding="utf-8"?>
-<p:sld xmlns:a="http://schemas.openxmlformats.org/drawingml/2006/main" xmlns:r="http://schemas.openxmlformats.org/officeDocument/2006/relationships" xmlns:p="http://schemas.openxmlformats.org/presentationml/2006/main">
-  <p:cSld>
-    <p:spTree>
-      <p:nvGrpSpPr>
-        <p:cNvPr id="1" name=""/>
-        <p:cNvGrpSpPr/>
-        <p:nvPr/>
-      </p:nvGrpSpPr>
-      <p:grpSpPr>
-        <a:xfrm>
-          <a:off x="0" y="0"/>
-          <a:ext cx="0" cy="0"/>
-          <a:chOff x="0" y="0"/>
-          <a:chExt cx="0" cy="0"/>
-        </a:xfrm>
-      </p:grpSpPr>
-      <p:sp>
-        <p:nvSpPr>
-          <p:cNvPr id="2" name="Titre 1"/>
-          <p:cNvSpPr>
-            <a:spLocks noGrp="1"/>
-          </p:cNvSpPr>
-          <p:nvPr>
-            <p:ph type="title"/>
-          </p:nvPr>
-        </p:nvSpPr>
-        <p:spPr/>
-        <p:txBody>
-          <a:bodyPr/>
-          <a:lstStyle/>
-          <a:p>
-            <a:r>
-              <a:rPr lang="fr-CA" dirty="0" err="1" smtClean="0"/>
-              <a:t>MATERIEL</a:t>
-            </a:r>
-            <a:endParaRPr lang="fr-CA" dirty="0"/>
-          </a:p>
-        </p:txBody>
-      </p:sp>
-      <p:sp>
-        <p:nvSpPr>
-          <p:cNvPr id="3" name="Espace réservé du contenu 2"/>
-          <p:cNvSpPr>
-            <a:spLocks noGrp="1"/>
-          </p:cNvSpPr>
-          <p:nvPr>
-            <p:ph idx="1"/>
-          </p:nvPr>
-        </p:nvSpPr>
-        <p:spPr/>
-        <p:txBody>
-          <a:bodyPr/>
-          <a:lstStyle/>
-          <a:p>
-            <a:pPr>
-              <a:buClr>
-                <a:srgbClr val="FD4901"/>
-              </a:buClr>
-              <a:buFont typeface="Arial" panose="020B0604020202020204" pitchFamily="34" charset="0"/>
-              <a:buChar char="•"/>
-            </a:pPr>
-            <a:r>
-              <a:rPr lang="fr-CA" dirty="0" smtClean="0"/>
-              <a:t>4 couches</a:t>
-            </a:r>
-          </a:p>
-          <a:p>
-            <a:pPr>
-              <a:buClr>
-                <a:srgbClr val="FD4901"/>
-              </a:buClr>
-              <a:buFont typeface="Arial" panose="020B0604020202020204" pitchFamily="34" charset="0"/>
-              <a:buChar char="•"/>
-            </a:pPr>
-            <a:r>
-              <a:rPr lang="fr-CA" dirty="0" smtClean="0"/>
-              <a:t>Stencil</a:t>
-            </a:r>
-          </a:p>
-          <a:p>
-            <a:pPr>
-              <a:buClr>
-                <a:srgbClr val="FD4901"/>
-              </a:buClr>
-              <a:buFont typeface="Arial" panose="020B0604020202020204" pitchFamily="34" charset="0"/>
-              <a:buChar char="•"/>
-            </a:pPr>
-            <a:r>
-              <a:rPr lang="fr-CA" dirty="0" smtClean="0"/>
-              <a:t>Niveaux de tensions</a:t>
-            </a:r>
-            <a:endParaRPr lang="fr-CA" dirty="0"/>
-          </a:p>
-        </p:txBody>
-      </p:sp>
-    </p:spTree>
-    <p:extLst>
-      <p:ext uri="{BB962C8B-B14F-4D97-AF65-F5344CB8AC3E}">
-        <p14:creationId xmlns:p14="http://schemas.microsoft.com/office/powerpoint/2010/main" val="3783753933"/>
-      </p:ext>
-    </p:extLst>
-  </p:cSld>
-  <p:clrMapOvr>
-    <a:masterClrMapping/>
-  </p:clrMapOvr>
-  <mc:AlternateContent xmlns:mc="http://schemas.openxmlformats.org/markup-compatibility/2006" xmlns:p14="http://schemas.microsoft.com/office/powerpoint/2010/main">
-    <mc:Choice Requires="p14">
-      <p:transition p14:dur="100">
-        <p:dissolve/>
-      </p:transition>
-    </mc:Choice>
-    <mc:Fallback xmlns="">
-      <p:transition>
-        <p:dissolve/>
-      </p:transition>
-    </mc:Fallback>
-  </mc:AlternateContent>
-  <p:timing>
-    <p:tnLst>
-      <p:par>
-        <p:cTn id="1" dur="indefinite" restart="never" nodeType="tmRoot">
-          <p:childTnLst>
-            <p:seq concurrent="1" nextAc="seek">
-              <p:cTn id="2" dur="indefinite" nodeType="mainSeq">
-                <p:childTnLst>
-                  <p:par>
-                    <p:cTn id="3" fill="hold">
-                      <p:stCondLst>
-                        <p:cond delay="indefinite"/>
-                      </p:stCondLst>
-                      <p:childTnLst>
-                        <p:par>
-                          <p:cTn id="4" fill="hold">
-                            <p:stCondLst>
-                              <p:cond delay="0"/>
-                            </p:stCondLst>
-                            <p:childTnLst>
-                              <p:par>
-                                <p:cTn id="5" presetID="10" presetClass="entr" presetSubtype="0" fill="hold" grpId="0" nodeType="clickEffect">
-                                  <p:stCondLst>
-                                    <p:cond delay="0"/>
-                                  </p:stCondLst>
-                                  <p:childTnLst>
-                                    <p:set>
-                                      <p:cBhvr>
-                                        <p:cTn id="6" dur="1" fill="hold">
-                                          <p:stCondLst>
-                                            <p:cond delay="0"/>
-                                          </p:stCondLst>
-                                        </p:cTn>
-                                        <p:tgtEl>
-                                          <p:spTgt spid="3">
-                                            <p:txEl>
-                                              <p:pRg st="0" end="0"/>
-                                            </p:txEl>
-                                          </p:spTgt>
-                                        </p:tgtEl>
-                                        <p:attrNameLst>
-                                          <p:attrName>style.visibility</p:attrName>
-                                        </p:attrNameLst>
-                                      </p:cBhvr>
-                                      <p:to>
-                                        <p:strVal val="visible"/>
-                                      </p:to>
-                                    </p:set>
-                                    <p:animEffect transition="in" filter="fade">
-                                      <p:cBhvr>
-                                        <p:cTn id="7" dur="500"/>
-                                        <p:tgtEl>
-                                          <p:spTgt spid="3">
-                                            <p:txEl>
-                                              <p:pRg st="0" end="0"/>
-                                            </p:txEl>
-                                          </p:spTgt>
-                                        </p:tgtEl>
-                                      </p:cBhvr>
-                                    </p:animEffect>
-                                  </p:childTnLst>
-                                </p:cTn>
-                              </p:par>
-                            </p:childTnLst>
-                          </p:cTn>
-                        </p:par>
-                      </p:childTnLst>
-                    </p:cTn>
-                  </p:par>
-                  <p:par>
-                    <p:cTn id="8" fill="hold">
-                      <p:stCondLst>
-                        <p:cond delay="indefinite"/>
-                      </p:stCondLst>
-                      <p:childTnLst>
-                        <p:par>
-                          <p:cTn id="9" fill="hold">
-                            <p:stCondLst>
-                              <p:cond delay="0"/>
-                            </p:stCondLst>
-                            <p:childTnLst>
-                              <p:par>
-                                <p:cTn id="10" presetID="10" presetClass="entr" presetSubtype="0" fill="hold" grpId="0" nodeType="clickEffect">
-                                  <p:stCondLst>
-                                    <p:cond delay="0"/>
-                                  </p:stCondLst>
-                                  <p:childTnLst>
-                                    <p:set>
-                                      <p:cBhvr>
-                                        <p:cTn id="11" dur="1" fill="hold">
-                                          <p:stCondLst>
-                                            <p:cond delay="0"/>
-                                          </p:stCondLst>
-                                        </p:cTn>
-                                        <p:tgtEl>
-                                          <p:spTgt spid="3">
-                                            <p:txEl>
-                                              <p:pRg st="1" end="1"/>
-                                            </p:txEl>
-                                          </p:spTgt>
-                                        </p:tgtEl>
-                                        <p:attrNameLst>
-                                          <p:attrName>style.visibility</p:attrName>
-                                        </p:attrNameLst>
-                                      </p:cBhvr>
-                                      <p:to>
-                                        <p:strVal val="visible"/>
-                                      </p:to>
-                                    </p:set>
-                                    <p:animEffect transition="in" filter="fade">
-                                      <p:cBhvr>
-                                        <p:cTn id="12" dur="500"/>
-                                        <p:tgtEl>
-                                          <p:spTgt spid="3">
-                                            <p:txEl>
-                                              <p:pRg st="1" end="1"/>
-                                            </p:txEl>
-                                          </p:spTgt>
-                                        </p:tgtEl>
-                                      </p:cBhvr>
-                                    </p:animEffect>
-                                  </p:childTnLst>
-                                </p:cTn>
-                              </p:par>
-                            </p:childTnLst>
-                          </p:cTn>
-                        </p:par>
-                      </p:childTnLst>
-                    </p:cTn>
-                  </p:par>
-                  <p:par>
-                    <p:cTn id="13" fill="hold">
-                      <p:stCondLst>
-                        <p:cond delay="indefinite"/>
-                      </p:stCondLst>
-                      <p:childTnLst>
-                        <p:par>
-                          <p:cTn id="14" fill="hold">
-                            <p:stCondLst>
-                              <p:cond delay="0"/>
-                            </p:stCondLst>
-                            <p:childTnLst>
-                              <p:par>
-                                <p:cTn id="15" presetID="10" presetClass="entr" presetSubtype="0" fill="hold" grpId="0" nodeType="clickEffect">
-                                  <p:stCondLst>
-                                    <p:cond delay="0"/>
-                                  </p:stCondLst>
-                                  <p:childTnLst>
-                                    <p:set>
-                                      <p:cBhvr>
-                                        <p:cTn id="16" dur="1" fill="hold">
-                                          <p:stCondLst>
-                                            <p:cond delay="0"/>
-                                          </p:stCondLst>
-                                        </p:cTn>
-                                        <p:tgtEl>
-                                          <p:spTgt spid="3">
-                                            <p:txEl>
-                                              <p:pRg st="2" end="2"/>
-                                            </p:txEl>
-                                          </p:spTgt>
-                                        </p:tgtEl>
-                                        <p:attrNameLst>
-                                          <p:attrName>style.visibility</p:attrName>
-                                        </p:attrNameLst>
-                                      </p:cBhvr>
-                                      <p:to>
-                                        <p:strVal val="visible"/>
-                                      </p:to>
-                                    </p:set>
-                                    <p:animEffect transition="in" filter="fade">
-                                      <p:cBhvr>
-                                        <p:cTn id="17" dur="500"/>
-                                        <p:tgtEl>
-                                          <p:spTgt spid="3">
-                                            <p:txEl>
-                                              <p:pRg st="2" end="2"/>
-                                            </p:txEl>
-                                          </p:spTgt>
-                                        </p:tgtEl>
-                                      </p:cBhvr>
-                                    </p:animEffect>
-                                  </p:childTnLst>
-                                </p:cTn>
-                              </p:par>
-                            </p:childTnLst>
-                          </p:cTn>
-                        </p:par>
-                      </p:childTnLst>
-                    </p:cTn>
-                  </p:par>
-                </p:childTnLst>
-              </p:cTn>
-              <p:prevCondLst>
-                <p:cond evt="onPrev" delay="0">
-                  <p:tgtEl>
-                    <p:sldTgt/>
-                  </p:tgtEl>
-                </p:cond>
-              </p:prevCondLst>
-              <p:nextCondLst>
-                <p:cond evt="onNext" delay="0">
-                  <p:tgtEl>
-                    <p:sldTgt/>
-                  </p:tgtEl>
-                </p:cond>
-              </p:nextCondLst>
-            </p:seq>
-          </p:childTnLst>
-        </p:cTn>
-      </p:par>
-    </p:tnLst>
-    <p:bldLst>
-      <p:bldP spid="3" grpId="0" build="p"/>
-    </p:bldLst>
-  </p:timing>
-</p:sld>
-</file>
-
-<file path=ppt/slides/slide7.xml><?xml version="1.0" encoding="utf-8"?>
 <p:sld xmlns:a="http://schemas.openxmlformats.org/drawingml/2006/main" xmlns:r="http://schemas.openxmlformats.org/officeDocument/2006/relationships" xmlns:p="http://schemas.openxmlformats.org/presentationml/2006/main">
   <p:cSld>
     <p:spTree>
@@ -21644,7 +21132,7 @@
 </p:sld>
 </file>
 
-<file path=ppt/slides/slide8.xml><?xml version="1.0" encoding="utf-8"?>
+<file path=ppt/slides/slide7.xml><?xml version="1.0" encoding="utf-8"?>
 <p:sld xmlns:a="http://schemas.openxmlformats.org/drawingml/2006/main" xmlns:r="http://schemas.openxmlformats.org/officeDocument/2006/relationships" xmlns:p="http://schemas.openxmlformats.org/presentationml/2006/main">
   <p:cSld>
     <p:spTree>
@@ -22153,6 +21641,129 @@
 </p:sld>
 </file>
 
+<file path=ppt/slides/slide8.xml><?xml version="1.0" encoding="utf-8"?>
+<p:sld xmlns:a="http://schemas.openxmlformats.org/drawingml/2006/main" xmlns:r="http://schemas.openxmlformats.org/officeDocument/2006/relationships" xmlns:p="http://schemas.openxmlformats.org/presentationml/2006/main">
+  <p:cSld>
+    <p:spTree>
+      <p:nvGrpSpPr>
+        <p:cNvPr id="1" name=""/>
+        <p:cNvGrpSpPr/>
+        <p:nvPr/>
+      </p:nvGrpSpPr>
+      <p:grpSpPr>
+        <a:xfrm>
+          <a:off x="0" y="0"/>
+          <a:ext cx="0" cy="0"/>
+          <a:chOff x="0" y="0"/>
+          <a:chExt cx="0" cy="0"/>
+        </a:xfrm>
+      </p:grpSpPr>
+      <p:sp>
+        <p:nvSpPr>
+          <p:cNvPr id="2" name="Titre 1"/>
+          <p:cNvSpPr>
+            <a:spLocks noGrp="1"/>
+          </p:cNvSpPr>
+          <p:nvPr>
+            <p:ph type="title"/>
+          </p:nvPr>
+        </p:nvSpPr>
+        <p:spPr/>
+        <p:txBody>
+          <a:bodyPr/>
+          <a:lstStyle/>
+          <a:p>
+            <a:r>
+              <a:rPr lang="fr-CA" dirty="0"/>
+              <a:t>SITE </a:t>
+            </a:r>
+            <a:r>
+              <a:rPr lang="fr-CA" dirty="0">
+                <a:solidFill>
+                  <a:srgbClr val="FE692E"/>
+                </a:solidFill>
+              </a:rPr>
+              <a:t>WEB</a:t>
+            </a:r>
+          </a:p>
+        </p:txBody>
+      </p:sp>
+      <p:sp>
+        <p:nvSpPr>
+          <p:cNvPr id="3" name="Espace réservé du contenu 2"/>
+          <p:cNvSpPr>
+            <a:spLocks noGrp="1"/>
+          </p:cNvSpPr>
+          <p:nvPr>
+            <p:ph idx="1"/>
+          </p:nvPr>
+        </p:nvSpPr>
+        <p:spPr/>
+        <p:txBody>
+          <a:bodyPr/>
+          <a:lstStyle/>
+          <a:p>
+            <a:endParaRPr lang="fr-CA"/>
+          </a:p>
+        </p:txBody>
+      </p:sp>
+      <p:pic>
+        <p:nvPicPr>
+          <p:cNvPr id="4" name="Image 3">
+            <a:hlinkClick r:id="rId2"/>
+          </p:cNvPr>
+          <p:cNvPicPr>
+            <a:picLocks noChangeAspect="1"/>
+          </p:cNvPicPr>
+          <p:nvPr/>
+        </p:nvPicPr>
+        <p:blipFill rotWithShape="1">
+          <a:blip r:embed="rId3"/>
+          <a:srcRect t="4688"/>
+          <a:stretch/>
+        </p:blipFill>
+        <p:spPr>
+          <a:xfrm>
+            <a:off x="1366519" y="923365"/>
+            <a:ext cx="9519921" cy="5279890"/>
+          </a:xfrm>
+          <a:prstGeom prst="rect">
+            <a:avLst/>
+          </a:prstGeom>
+        </p:spPr>
+      </p:pic>
+    </p:spTree>
+    <p:extLst>
+      <p:ext uri="{BB962C8B-B14F-4D97-AF65-F5344CB8AC3E}">
+        <p14:creationId xmlns:p14="http://schemas.microsoft.com/office/powerpoint/2010/main" val="2778648903"/>
+      </p:ext>
+    </p:extLst>
+  </p:cSld>
+  <p:clrMapOvr>
+    <a:masterClrMapping/>
+  </p:clrMapOvr>
+  <mc:AlternateContent xmlns:mc="http://schemas.openxmlformats.org/markup-compatibility/2006" xmlns:p14="http://schemas.microsoft.com/office/powerpoint/2010/main">
+    <mc:Choice Requires="p14">
+      <p:transition p14:dur="100">
+        <p:dissolve/>
+      </p:transition>
+    </mc:Choice>
+    <mc:Fallback xmlns="">
+      <p:transition>
+        <p:dissolve/>
+      </p:transition>
+    </mc:Fallback>
+  </mc:AlternateContent>
+  <p:timing>
+    <p:tnLst>
+      <p:par>
+        <p:cTn id="1" dur="indefinite" restart="never" nodeType="tmRoot"/>
+      </p:par>
+    </p:tnLst>
+  </p:timing>
+</p:sld>
+</file>
+
 <file path=ppt/slides/slide9.xml><?xml version="1.0" encoding="utf-8"?>
 <p:sld xmlns:a="http://schemas.openxmlformats.org/drawingml/2006/main" xmlns:r="http://schemas.openxmlformats.org/officeDocument/2006/relationships" xmlns:p="http://schemas.openxmlformats.org/presentationml/2006/main">
   <p:cSld>
@@ -22187,27 +21798,19 @@
           <a:p>
             <a:r>
               <a:rPr lang="fr-CA" dirty="0"/>
-              <a:t>SITE </a:t>
-            </a:r>
-            <a:r>
-              <a:rPr lang="fr-CA" dirty="0">
-                <a:solidFill>
-                  <a:srgbClr val="FE692E"/>
-                </a:solidFill>
-              </a:rPr>
-              <a:t>WEB</a:t>
+              <a:t>MERCI!</a:t>
             </a:r>
           </a:p>
         </p:txBody>
       </p:sp>
       <p:sp>
         <p:nvSpPr>
-          <p:cNvPr id="3" name="Espace réservé du contenu 2"/>
+          <p:cNvPr id="4" name="Espace réservé du texte 3"/>
           <p:cNvSpPr>
             <a:spLocks noGrp="1"/>
           </p:cNvSpPr>
           <p:nvPr>
-            <p:ph idx="1"/>
+            <p:ph type="body" sz="half" idx="2"/>
           </p:nvPr>
         </p:nvSpPr>
         <p:spPr/>
@@ -22221,33 +21824,98 @@
       </p:sp>
       <p:pic>
         <p:nvPicPr>
-          <p:cNvPr id="4" name="Image 3">
-            <a:hlinkClick r:id="rId2"/>
-          </p:cNvPr>
+          <p:cNvPr id="7" name="Image 6"/>
           <p:cNvPicPr>
             <a:picLocks noChangeAspect="1"/>
           </p:cNvPicPr>
           <p:nvPr/>
         </p:nvPicPr>
-        <p:blipFill rotWithShape="1">
-          <a:blip r:embed="rId3"/>
-          <a:srcRect t="4688"/>
-          <a:stretch/>
+        <p:blipFill>
+          <a:blip r:embed="rId2" cstate="print">
+            <a:extLst>
+              <a:ext uri="{28A0092B-C50C-407E-A947-70E740481C1C}">
+                <a14:useLocalDpi xmlns:a14="http://schemas.microsoft.com/office/drawing/2010/main" val="0"/>
+              </a:ext>
+            </a:extLst>
+          </a:blip>
+          <a:stretch>
+            <a:fillRect/>
+          </a:stretch>
         </p:blipFill>
         <p:spPr>
           <a:xfrm>
-            <a:off x="1366519" y="923365"/>
-            <a:ext cx="9519921" cy="5279890"/>
+            <a:off x="0" y="-1"/>
+            <a:ext cx="9997448" cy="5623565"/>
           </a:xfrm>
           <a:prstGeom prst="rect">
             <a:avLst/>
           </a:prstGeom>
         </p:spPr>
       </p:pic>
+      <p:pic>
+        <p:nvPicPr>
+          <p:cNvPr id="1026" name="Picture 2" descr="https://scontent.fyhu1-1.fna.fbcdn.net/v/t1.15752-9/s2048x2048/61667264_357624584892437_8334581975750803456_n.jpg?_nc_cat=105&amp;_nc_ht=scontent.fyhu1-1.fna&amp;oh=fa8e486d2f34afefa20af0eebce5f359&amp;oe=5D5D624F"/>
+          <p:cNvPicPr>
+            <a:picLocks noChangeAspect="1" noChangeArrowheads="1"/>
+          </p:cNvPicPr>
+          <p:nvPr/>
+        </p:nvPicPr>
+        <p:blipFill rotWithShape="1">
+          <a:blip r:embed="rId3" cstate="print">
+            <a:extLst>
+              <a:ext uri="{28A0092B-C50C-407E-A947-70E740481C1C}">
+                <a14:useLocalDpi xmlns:a14="http://schemas.microsoft.com/office/drawing/2010/main" val="0"/>
+              </a:ext>
+            </a:extLst>
+          </a:blip>
+          <a:srcRect l="15968" t="24847" r="29727" b="3709"/>
+          <a:stretch/>
+        </p:blipFill>
+        <p:spPr bwMode="auto">
+          <a:xfrm>
+            <a:off x="333376" y="3732117"/>
+            <a:ext cx="3905250" cy="2890021"/>
+          </a:xfrm>
+          <a:prstGeom prst="snip2DiagRect">
+            <a:avLst/>
+          </a:prstGeom>
+          <a:solidFill>
+            <a:srgbClr val="FFFFFF">
+              <a:shade val="85000"/>
+            </a:srgbClr>
+          </a:solidFill>
+          <a:ln w="88900" cap="sq">
+            <a:solidFill>
+              <a:srgbClr val="FFFFFF"/>
+            </a:solidFill>
+            <a:miter lim="800000"/>
+          </a:ln>
+          <a:effectLst>
+            <a:outerShdw blurRad="88900" algn="tl" rotWithShape="0">
+              <a:srgbClr val="000000">
+                <a:alpha val="45000"/>
+              </a:srgbClr>
+            </a:outerShdw>
+          </a:effectLst>
+          <a:scene3d>
+            <a:camera prst="orthographicFront"/>
+            <a:lightRig rig="twoPt" dir="t">
+              <a:rot lat="0" lon="0" rev="7200000"/>
+            </a:lightRig>
+          </a:scene3d>
+          <a:sp3d>
+            <a:bevelT w="25400" h="19050"/>
+            <a:contourClr>
+              <a:srgbClr val="FFFFFF"/>
+            </a:contourClr>
+          </a:sp3d>
+          <a:extLst/>
+        </p:spPr>
+      </p:pic>
     </p:spTree>
     <p:extLst>
       <p:ext uri="{BB962C8B-B14F-4D97-AF65-F5344CB8AC3E}">
-        <p14:creationId xmlns:p14="http://schemas.microsoft.com/office/powerpoint/2010/main" val="2778648903"/>
+        <p14:creationId xmlns:p14="http://schemas.microsoft.com/office/powerpoint/2010/main" val="2047355086"/>
       </p:ext>
     </p:extLst>
   </p:cSld>

</xml_diff>